<commit_message>
allow an origin value for the track shape
</commit_message>
<xml_diff>
--- a/donor.pptx
+++ b/donor.pptx
@@ -106,7 +106,7 @@
   </p:defaultTextStyle>
   <p:extLst>
     <p:ext uri="{EFAFB233-063F-42B5-8137-9DF3F51BA10A}">
-      <p15:sldGuideLst xmlns:p15="http://schemas.microsoft.com/office/powerpoint/2012/main" xmlns="">
+      <p15:sldGuideLst xmlns="" xmlns:p15="http://schemas.microsoft.com/office/powerpoint/2012/main">
         <p15:guide id="1" orient="horz" pos="2160">
           <p15:clr>
             <a:srgbClr val="A4A3A4"/>
@@ -3164,7 +3164,7 @@
         </p:nvSpPr>
         <p:spPr>
           <a:xfrm>
-            <a:off x="0" y="0"/>
+            <a:off x="2113302" y="1964389"/>
             <a:ext cx="1478320" cy="1696772"/>
           </a:xfrm>
           <a:custGeom>

</xml_diff>

<commit_message>
fix for issue #21, text is added now to each callout/maker
</commit_message>
<xml_diff>
--- a/donor.pptx
+++ b/donor.pptx
@@ -106,7 +106,7 @@
   </p:defaultTextStyle>
   <p:extLst>
     <p:ext uri="{EFAFB233-063F-42B5-8137-9DF3F51BA10A}">
-      <p15:sldGuideLst xmlns="" xmlns:p15="http://schemas.microsoft.com/office/powerpoint/2012/main">
+      <p15:sldGuideLst xmlns:p15="http://schemas.microsoft.com/office/powerpoint/2012/main">
         <p15:guide id="1" orient="horz" pos="2160">
           <p15:clr>
             <a:srgbClr val="A4A3A4"/>
@@ -304,7 +304,7 @@
           <a:p>
             <a:fld id="{07AF7C9C-3FFC-F543-8CD5-56B058077314}" type="datetimeFigureOut">
               <a:rPr lang="en-US" smtClean="0"/>
-              <a:t>20/06/18</a:t>
+              <a:t>6/25/18</a:t>
             </a:fld>
             <a:endParaRPr lang="en-US"/>
           </a:p>
@@ -474,7 +474,7 @@
           <a:p>
             <a:fld id="{07AF7C9C-3FFC-F543-8CD5-56B058077314}" type="datetimeFigureOut">
               <a:rPr lang="en-US" smtClean="0"/>
-              <a:t>20/06/18</a:t>
+              <a:t>6/25/18</a:t>
             </a:fld>
             <a:endParaRPr lang="en-US"/>
           </a:p>
@@ -654,7 +654,7 @@
           <a:p>
             <a:fld id="{07AF7C9C-3FFC-F543-8CD5-56B058077314}" type="datetimeFigureOut">
               <a:rPr lang="en-US" smtClean="0"/>
-              <a:t>20/06/18</a:t>
+              <a:t>6/25/18</a:t>
             </a:fld>
             <a:endParaRPr lang="en-US"/>
           </a:p>
@@ -824,7 +824,7 @@
           <a:p>
             <a:fld id="{07AF7C9C-3FFC-F543-8CD5-56B058077314}" type="datetimeFigureOut">
               <a:rPr lang="en-US" smtClean="0"/>
-              <a:t>20/06/18</a:t>
+              <a:t>6/25/18</a:t>
             </a:fld>
             <a:endParaRPr lang="en-US"/>
           </a:p>
@@ -1070,7 +1070,7 @@
           <a:p>
             <a:fld id="{07AF7C9C-3FFC-F543-8CD5-56B058077314}" type="datetimeFigureOut">
               <a:rPr lang="en-US" smtClean="0"/>
-              <a:t>20/06/18</a:t>
+              <a:t>6/25/18</a:t>
             </a:fld>
             <a:endParaRPr lang="en-US"/>
           </a:p>
@@ -1358,7 +1358,7 @@
           <a:p>
             <a:fld id="{07AF7C9C-3FFC-F543-8CD5-56B058077314}" type="datetimeFigureOut">
               <a:rPr lang="en-US" smtClean="0"/>
-              <a:t>20/06/18</a:t>
+              <a:t>6/25/18</a:t>
             </a:fld>
             <a:endParaRPr lang="en-US"/>
           </a:p>
@@ -1780,7 +1780,7 @@
           <a:p>
             <a:fld id="{07AF7C9C-3FFC-F543-8CD5-56B058077314}" type="datetimeFigureOut">
               <a:rPr lang="en-US" smtClean="0"/>
-              <a:t>20/06/18</a:t>
+              <a:t>6/25/18</a:t>
             </a:fld>
             <a:endParaRPr lang="en-US"/>
           </a:p>
@@ -1898,7 +1898,7 @@
           <a:p>
             <a:fld id="{07AF7C9C-3FFC-F543-8CD5-56B058077314}" type="datetimeFigureOut">
               <a:rPr lang="en-US" smtClean="0"/>
-              <a:t>20/06/18</a:t>
+              <a:t>6/25/18</a:t>
             </a:fld>
             <a:endParaRPr lang="en-US"/>
           </a:p>
@@ -1993,7 +1993,7 @@
           <a:p>
             <a:fld id="{07AF7C9C-3FFC-F543-8CD5-56B058077314}" type="datetimeFigureOut">
               <a:rPr lang="en-US" smtClean="0"/>
-              <a:t>20/06/18</a:t>
+              <a:t>6/25/18</a:t>
             </a:fld>
             <a:endParaRPr lang="en-US"/>
           </a:p>
@@ -2270,7 +2270,7 @@
           <a:p>
             <a:fld id="{07AF7C9C-3FFC-F543-8CD5-56B058077314}" type="datetimeFigureOut">
               <a:rPr lang="en-US" smtClean="0"/>
-              <a:t>20/06/18</a:t>
+              <a:t>6/25/18</a:t>
             </a:fld>
             <a:endParaRPr lang="en-US"/>
           </a:p>
@@ -2523,7 +2523,7 @@
           <a:p>
             <a:fld id="{07AF7C9C-3FFC-F543-8CD5-56B058077314}" type="datetimeFigureOut">
               <a:rPr lang="en-US" smtClean="0"/>
-              <a:t>20/06/18</a:t>
+              <a:t>6/25/18</a:t>
             </a:fld>
             <a:endParaRPr lang="en-US"/>
           </a:p>
@@ -2736,7 +2736,7 @@
           <a:p>
             <a:fld id="{07AF7C9C-3FFC-F543-8CD5-56B058077314}" type="datetimeFigureOut">
               <a:rPr lang="en-US" smtClean="0"/>
-              <a:t>20/06/18</a:t>
+              <a:t>6/25/18</a:t>
             </a:fld>
             <a:endParaRPr lang="en-US"/>
           </a:p>
@@ -3250,7 +3250,11 @@
           <a:lstStyle/>
           <a:p>
             <a:pPr algn="ctr"/>
-            <a:endParaRPr lang="en-US"/>
+            <a:r>
+              <a:rPr lang="en-US" sz="800" dirty="0" smtClean="0"/>
+              <a:t>a</a:t>
+            </a:r>
+            <a:endParaRPr lang="en-US" sz="800" dirty="0"/>
           </a:p>
         </p:txBody>
       </p:sp>
@@ -3267,7 +3271,7 @@
   <p:timing>
     <p:tnLst>
       <p:par>
-        <p:cTn xmlns:p14="http://schemas.microsoft.com/office/powerpoint/2010/main" id="1" dur="indefinite" restart="never" nodeType="tmRoot">
+        <p:cTn id="1" dur="indefinite" restart="never" nodeType="tmRoot">
           <p:childTnLst>
             <p:seq concurrent="1" nextAc="seek">
               <p:cTn id="2" dur="indefinite" nodeType="mainSeq">

</xml_diff>

<commit_message>
fix for issue #23 coloring of callout
</commit_message>
<xml_diff>
--- a/donor.pptx
+++ b/donor.pptx
@@ -3132,6 +3132,7 @@
               <a:lumMod val="85000"/>
             </a:schemeClr>
           </a:solidFill>
+          <a:ln w="38100"/>
         </p:spPr>
         <p:style>
           <a:lnRef idx="2">
@@ -3230,19 +3231,29 @@
           <a:prstGeom prst="ellipse">
             <a:avLst/>
           </a:prstGeom>
+          <a:solidFill>
+            <a:schemeClr val="bg1">
+              <a:lumMod val="95000"/>
+            </a:schemeClr>
+          </a:solidFill>
+          <a:ln w="50800">
+            <a:solidFill>
+              <a:srgbClr val="FF2600"/>
+            </a:solidFill>
+          </a:ln>
         </p:spPr>
         <p:style>
-          <a:lnRef idx="1">
-            <a:schemeClr val="accent1"/>
+          <a:lnRef idx="2">
+            <a:schemeClr val="accent3"/>
           </a:lnRef>
-          <a:fillRef idx="3">
-            <a:schemeClr val="accent1"/>
+          <a:fillRef idx="1">
+            <a:schemeClr val="lt1"/>
           </a:fillRef>
-          <a:effectRef idx="2">
-            <a:schemeClr val="accent1"/>
+          <a:effectRef idx="0">
+            <a:schemeClr val="accent3"/>
           </a:effectRef>
           <a:fontRef idx="minor">
-            <a:schemeClr val="lt1"/>
+            <a:schemeClr val="dk1"/>
           </a:fontRef>
         </p:style>
         <p:txBody>
@@ -3251,10 +3262,18 @@
           <a:p>
             <a:pPr algn="ctr"/>
             <a:r>
-              <a:rPr lang="en-US" sz="1000" dirty="0" err="1" smtClean="0"/>
+              <a:rPr lang="en-US" sz="1000" dirty="0" err="1" smtClean="0">
+                <a:solidFill>
+                  <a:sysClr val="windowText" lastClr="000000"/>
+                </a:solidFill>
+              </a:rPr>
               <a:t>aaaa</a:t>
             </a:r>
-            <a:endParaRPr lang="en-US" sz="1000" dirty="0"/>
+            <a:endParaRPr lang="en-US" sz="1000" dirty="0">
+              <a:solidFill>
+                <a:sysClr val="windowText" lastClr="000000"/>
+              </a:solidFill>
+            </a:endParaRPr>
           </a:p>
         </p:txBody>
       </p:sp>

</xml_diff>

<commit_message>
issue #22 and issue #11 fix experiment
</commit_message>
<xml_diff>
--- a/donor.pptx
+++ b/donor.pptx
@@ -304,7 +304,7 @@
           <a:p>
             <a:fld id="{07AF7C9C-3FFC-F543-8CD5-56B058077314}" type="datetimeFigureOut">
               <a:rPr lang="en-US" smtClean="0"/>
-              <a:t>6/26/18</a:t>
+              <a:t>6/27/18</a:t>
             </a:fld>
             <a:endParaRPr lang="en-US"/>
           </a:p>
@@ -474,7 +474,7 @@
           <a:p>
             <a:fld id="{07AF7C9C-3FFC-F543-8CD5-56B058077314}" type="datetimeFigureOut">
               <a:rPr lang="en-US" smtClean="0"/>
-              <a:t>6/26/18</a:t>
+              <a:t>6/27/18</a:t>
             </a:fld>
             <a:endParaRPr lang="en-US"/>
           </a:p>
@@ -654,7 +654,7 @@
           <a:p>
             <a:fld id="{07AF7C9C-3FFC-F543-8CD5-56B058077314}" type="datetimeFigureOut">
               <a:rPr lang="en-US" smtClean="0"/>
-              <a:t>6/26/18</a:t>
+              <a:t>6/27/18</a:t>
             </a:fld>
             <a:endParaRPr lang="en-US"/>
           </a:p>
@@ -824,7 +824,7 @@
           <a:p>
             <a:fld id="{07AF7C9C-3FFC-F543-8CD5-56B058077314}" type="datetimeFigureOut">
               <a:rPr lang="en-US" smtClean="0"/>
-              <a:t>6/26/18</a:t>
+              <a:t>6/27/18</a:t>
             </a:fld>
             <a:endParaRPr lang="en-US"/>
           </a:p>
@@ -1070,7 +1070,7 @@
           <a:p>
             <a:fld id="{07AF7C9C-3FFC-F543-8CD5-56B058077314}" type="datetimeFigureOut">
               <a:rPr lang="en-US" smtClean="0"/>
-              <a:t>6/26/18</a:t>
+              <a:t>6/27/18</a:t>
             </a:fld>
             <a:endParaRPr lang="en-US"/>
           </a:p>
@@ -1358,7 +1358,7 @@
           <a:p>
             <a:fld id="{07AF7C9C-3FFC-F543-8CD5-56B058077314}" type="datetimeFigureOut">
               <a:rPr lang="en-US" smtClean="0"/>
-              <a:t>6/26/18</a:t>
+              <a:t>6/27/18</a:t>
             </a:fld>
             <a:endParaRPr lang="en-US"/>
           </a:p>
@@ -1780,7 +1780,7 @@
           <a:p>
             <a:fld id="{07AF7C9C-3FFC-F543-8CD5-56B058077314}" type="datetimeFigureOut">
               <a:rPr lang="en-US" smtClean="0"/>
-              <a:t>6/26/18</a:t>
+              <a:t>6/27/18</a:t>
             </a:fld>
             <a:endParaRPr lang="en-US"/>
           </a:p>
@@ -1898,7 +1898,7 @@
           <a:p>
             <a:fld id="{07AF7C9C-3FFC-F543-8CD5-56B058077314}" type="datetimeFigureOut">
               <a:rPr lang="en-US" smtClean="0"/>
-              <a:t>6/26/18</a:t>
+              <a:t>6/27/18</a:t>
             </a:fld>
             <a:endParaRPr lang="en-US"/>
           </a:p>
@@ -1993,7 +1993,7 @@
           <a:p>
             <a:fld id="{07AF7C9C-3FFC-F543-8CD5-56B058077314}" type="datetimeFigureOut">
               <a:rPr lang="en-US" smtClean="0"/>
-              <a:t>6/26/18</a:t>
+              <a:t>6/27/18</a:t>
             </a:fld>
             <a:endParaRPr lang="en-US"/>
           </a:p>
@@ -2270,7 +2270,7 @@
           <a:p>
             <a:fld id="{07AF7C9C-3FFC-F543-8CD5-56B058077314}" type="datetimeFigureOut">
               <a:rPr lang="en-US" smtClean="0"/>
-              <a:t>6/26/18</a:t>
+              <a:t>6/27/18</a:t>
             </a:fld>
             <a:endParaRPr lang="en-US"/>
           </a:p>
@@ -2523,7 +2523,7 @@
           <a:p>
             <a:fld id="{07AF7C9C-3FFC-F543-8CD5-56B058077314}" type="datetimeFigureOut">
               <a:rPr lang="en-US" smtClean="0"/>
-              <a:t>6/26/18</a:t>
+              <a:t>6/27/18</a:t>
             </a:fld>
             <a:endParaRPr lang="en-US"/>
           </a:p>
@@ -2736,7 +2736,7 @@
           <a:p>
             <a:fld id="{07AF7C9C-3FFC-F543-8CD5-56B058077314}" type="datetimeFigureOut">
               <a:rPr lang="en-US" smtClean="0"/>
-              <a:t>6/26/18</a:t>
+              <a:t>6/27/18</a:t>
             </a:fld>
             <a:endParaRPr lang="en-US"/>
           </a:p>
@@ -3228,8 +3228,11 @@
             <a:off x="1290686" y="-133074"/>
             <a:ext cx="613385" cy="613385"/>
           </a:xfrm>
-          <a:prstGeom prst="ellipse">
-            <a:avLst/>
+          <a:prstGeom prst="wedgeRectCallout">
+            <a:avLst>
+              <a:gd name="adj1" fmla="val 48987"/>
+              <a:gd name="adj2" fmla="val 66274"/>
+            </a:avLst>
           </a:prstGeom>
           <a:solidFill>
             <a:schemeClr val="bg1">
@@ -3314,7 +3317,7 @@
                                     <p:cond delay="0"/>
                                   </p:stCondLst>
                                   <p:childTnLst>
-                                    <p:animMotion origin="layout" path="M 0.0 0.0 L 0.4 0.4 L 0.6 0.3 " pathEditMode="relative">
+                                    <p:animMotion origin="layout" path="M 0.0 0.0 L 0.4 0.4 L 0.6 0.3 " pathEditMode="fixed">
                                       <p:cBhvr>
                                         <p:cTn id="6" dur="2000" fill="hold"/>
                                         <p:tgtEl>

</xml_diff>

<commit_message>
Narratives added with intervals from gpx data file
</commit_message>
<xml_diff>
--- a/donor.pptx
+++ b/donor.pptx
@@ -304,7 +304,7 @@
           <a:p>
             <a:fld id="{07AF7C9C-3FFC-F543-8CD5-56B058077314}" type="datetimeFigureOut">
               <a:rPr lang="en-US" smtClean="0"/>
-              <a:t>6/30/18</a:t>
+              <a:t>7/9/18</a:t>
             </a:fld>
             <a:endParaRPr lang="en-US"/>
           </a:p>
@@ -474,7 +474,7 @@
           <a:p>
             <a:fld id="{07AF7C9C-3FFC-F543-8CD5-56B058077314}" type="datetimeFigureOut">
               <a:rPr lang="en-US" smtClean="0"/>
-              <a:t>6/30/18</a:t>
+              <a:t>7/9/18</a:t>
             </a:fld>
             <a:endParaRPr lang="en-US"/>
           </a:p>
@@ -654,7 +654,7 @@
           <a:p>
             <a:fld id="{07AF7C9C-3FFC-F543-8CD5-56B058077314}" type="datetimeFigureOut">
               <a:rPr lang="en-US" smtClean="0"/>
-              <a:t>6/30/18</a:t>
+              <a:t>7/9/18</a:t>
             </a:fld>
             <a:endParaRPr lang="en-US"/>
           </a:p>
@@ -824,7 +824,7 @@
           <a:p>
             <a:fld id="{07AF7C9C-3FFC-F543-8CD5-56B058077314}" type="datetimeFigureOut">
               <a:rPr lang="en-US" smtClean="0"/>
-              <a:t>6/30/18</a:t>
+              <a:t>7/9/18</a:t>
             </a:fld>
             <a:endParaRPr lang="en-US"/>
           </a:p>
@@ -1070,7 +1070,7 @@
           <a:p>
             <a:fld id="{07AF7C9C-3FFC-F543-8CD5-56B058077314}" type="datetimeFigureOut">
               <a:rPr lang="en-US" smtClean="0"/>
-              <a:t>6/30/18</a:t>
+              <a:t>7/9/18</a:t>
             </a:fld>
             <a:endParaRPr lang="en-US"/>
           </a:p>
@@ -1358,7 +1358,7 @@
           <a:p>
             <a:fld id="{07AF7C9C-3FFC-F543-8CD5-56B058077314}" type="datetimeFigureOut">
               <a:rPr lang="en-US" smtClean="0"/>
-              <a:t>6/30/18</a:t>
+              <a:t>7/9/18</a:t>
             </a:fld>
             <a:endParaRPr lang="en-US"/>
           </a:p>
@@ -1780,7 +1780,7 @@
           <a:p>
             <a:fld id="{07AF7C9C-3FFC-F543-8CD5-56B058077314}" type="datetimeFigureOut">
               <a:rPr lang="en-US" smtClean="0"/>
-              <a:t>6/30/18</a:t>
+              <a:t>7/9/18</a:t>
             </a:fld>
             <a:endParaRPr lang="en-US"/>
           </a:p>
@@ -1898,7 +1898,7 @@
           <a:p>
             <a:fld id="{07AF7C9C-3FFC-F543-8CD5-56B058077314}" type="datetimeFigureOut">
               <a:rPr lang="en-US" smtClean="0"/>
-              <a:t>6/30/18</a:t>
+              <a:t>7/9/18</a:t>
             </a:fld>
             <a:endParaRPr lang="en-US"/>
           </a:p>
@@ -1993,7 +1993,7 @@
           <a:p>
             <a:fld id="{07AF7C9C-3FFC-F543-8CD5-56B058077314}" type="datetimeFigureOut">
               <a:rPr lang="en-US" smtClean="0"/>
-              <a:t>6/30/18</a:t>
+              <a:t>7/9/18</a:t>
             </a:fld>
             <a:endParaRPr lang="en-US"/>
           </a:p>
@@ -2270,7 +2270,7 @@
           <a:p>
             <a:fld id="{07AF7C9C-3FFC-F543-8CD5-56B058077314}" type="datetimeFigureOut">
               <a:rPr lang="en-US" smtClean="0"/>
-              <a:t>6/30/18</a:t>
+              <a:t>7/9/18</a:t>
             </a:fld>
             <a:endParaRPr lang="en-US"/>
           </a:p>
@@ -2523,7 +2523,7 @@
           <a:p>
             <a:fld id="{07AF7C9C-3FFC-F543-8CD5-56B058077314}" type="datetimeFigureOut">
               <a:rPr lang="en-US" smtClean="0"/>
-              <a:t>6/30/18</a:t>
+              <a:t>7/9/18</a:t>
             </a:fld>
             <a:endParaRPr lang="en-US"/>
           </a:p>
@@ -2736,7 +2736,7 @@
           <a:p>
             <a:fld id="{07AF7C9C-3FFC-F543-8CD5-56B058077314}" type="datetimeFigureOut">
               <a:rPr lang="en-US" smtClean="0"/>
-              <a:t>6/30/18</a:t>
+              <a:t>7/9/18</a:t>
             </a:fld>
             <a:endParaRPr lang="en-US"/>
           </a:p>
@@ -3420,6 +3420,70 @@
               </a:solidFill>
               <a:latin typeface="Courier New"/>
               <a:cs typeface="Courier New"/>
+            </a:endParaRPr>
+          </a:p>
+        </p:txBody>
+      </p:sp>
+      <p:sp>
+        <p:nvSpPr>
+          <p:cNvPr id="3" name="narrative"/>
+          <p:cNvSpPr/>
+          <p:nvPr/>
+        </p:nvSpPr>
+        <p:spPr>
+          <a:xfrm>
+            <a:off x="6241397" y="2281867"/>
+            <a:ext cx="1988203" cy="1732922"/>
+          </a:xfrm>
+          <a:prstGeom prst="rect">
+            <a:avLst/>
+          </a:prstGeom>
+          <a:solidFill>
+            <a:schemeClr val="tx1">
+              <a:lumMod val="95000"/>
+              <a:lumOff val="5000"/>
+            </a:schemeClr>
+          </a:solidFill>
+        </p:spPr>
+        <p:style>
+          <a:lnRef idx="1">
+            <a:schemeClr val="accent1"/>
+          </a:lnRef>
+          <a:fillRef idx="3">
+            <a:schemeClr val="accent1"/>
+          </a:fillRef>
+          <a:effectRef idx="2">
+            <a:schemeClr val="accent1"/>
+          </a:effectRef>
+          <a:fontRef idx="minor">
+            <a:schemeClr val="lt1"/>
+          </a:fontRef>
+        </p:style>
+        <p:txBody>
+          <a:bodyPr rtlCol="0" anchor="ctr"/>
+          <a:lstStyle/>
+          <a:p>
+            <a:pPr algn="ctr"/>
+            <a:r>
+              <a:rPr lang="en-US" sz="1400" dirty="0" smtClean="0">
+                <a:solidFill>
+                  <a:schemeClr val="bg1"/>
+                </a:solidFill>
+              </a:rPr>
+              <a:t>Narrative goes here</a:t>
+            </a:r>
+            <a:r>
+              <a:rPr lang="mr-IN" sz="1400" dirty="0" smtClean="0">
+                <a:solidFill>
+                  <a:schemeClr val="bg1"/>
+                </a:solidFill>
+              </a:rPr>
+              <a:t>…</a:t>
+            </a:r>
+            <a:endParaRPr lang="en-US" sz="1400" dirty="0">
+              <a:solidFill>
+                <a:schemeClr val="bg1"/>
+              </a:solidFill>
             </a:endParaRPr>
           </a:p>
         </p:txBody>

</xml_diff>

<commit_message>
Adding the footprint that will be used in the creation of the path.
</commit_message>
<xml_diff>
--- a/donor.pptx
+++ b/donor.pptx
@@ -3485,6 +3485,44 @@
                 <a:schemeClr val="bg1"/>
               </a:solidFill>
             </a:endParaRPr>
+          </a:p>
+        </p:txBody>
+      </p:sp>
+      <p:sp>
+        <p:nvSpPr>
+          <p:cNvPr id="10" name="footprint"/>
+          <p:cNvSpPr/>
+          <p:nvPr/>
+        </p:nvSpPr>
+        <p:spPr>
+          <a:xfrm>
+            <a:off x="6800932" y="4118396"/>
+            <a:ext cx="80881" cy="77368"/>
+          </a:xfrm>
+          <a:prstGeom prst="ellipse">
+            <a:avLst/>
+          </a:prstGeom>
+        </p:spPr>
+        <p:style>
+          <a:lnRef idx="1">
+            <a:schemeClr val="accent1"/>
+          </a:lnRef>
+          <a:fillRef idx="3">
+            <a:schemeClr val="accent1"/>
+          </a:fillRef>
+          <a:effectRef idx="2">
+            <a:schemeClr val="accent1"/>
+          </a:effectRef>
+          <a:fontRef idx="minor">
+            <a:schemeClr val="lt1"/>
+          </a:fontRef>
+        </p:style>
+        <p:txBody>
+          <a:bodyPr rtlCol="0" anchor="ctr"/>
+          <a:lstStyle/>
+          <a:p>
+            <a:pPr algn="ctr"/>
+            <a:endParaRPr lang="en-US"/>
           </a:p>
         </p:txBody>
       </p:sp>

</xml_diff>